<commit_message>
Update lab 1 it008
</commit_message>
<xml_diff>
--- a/IT008-Visual programming/Slide thực hành/Lab 1..pptx
+++ b/IT008-Visual programming/Slide thực hành/Lab 1..pptx
@@ -207,7 +207,7 @@
           </a:lstStyle>
           <a:p>
             <a:fld id="{D58EBEF0-1929-6C4C-9D10-0A24CA585262}" type="datetimeFigureOut">
-              <a:t>21/09/2023</a:t>
+              <a:t>23/09/2023</a:t>
             </a:fld>
             <a:endParaRPr lang="en-VN"/>
           </a:p>
@@ -602,7 +602,7 @@
           <a:lstStyle/>
           <a:p>
             <a:fld id="{0DDB0C27-5CC0-AE4B-A9B6-1C1A8F15976E}" type="datetime1">
-              <a:t>21/09/2023</a:t>
+              <a:t>23/09/2023</a:t>
             </a:fld>
             <a:endParaRPr lang="en-US"/>
           </a:p>
@@ -769,7 +769,7 @@
           <a:lstStyle/>
           <a:p>
             <a:fld id="{A1AB976C-5E89-BE46-B6A2-18E033DC7B7F}" type="datetime1">
-              <a:t>21/09/2023</a:t>
+              <a:t>23/09/2023</a:t>
             </a:fld>
             <a:endParaRPr lang="en-US"/>
           </a:p>
@@ -946,7 +946,7 @@
           <a:lstStyle/>
           <a:p>
             <a:fld id="{D3EB9961-F7AC-F442-9DA7-5C044E83E8F0}" type="datetime1">
-              <a:t>21/09/2023</a:t>
+              <a:t>23/09/2023</a:t>
             </a:fld>
             <a:endParaRPr lang="en-US"/>
           </a:p>
@@ -1113,7 +1113,7 @@
           <a:lstStyle/>
           <a:p>
             <a:fld id="{2BC5C2EC-D52B-4E49-9BD2-7F34EF2A2110}" type="datetime1">
-              <a:t>21/09/2023</a:t>
+              <a:t>23/09/2023</a:t>
             </a:fld>
             <a:endParaRPr lang="en-US"/>
           </a:p>
@@ -1357,7 +1357,7 @@
           <a:lstStyle/>
           <a:p>
             <a:fld id="{2E689BA2-5EDF-204F-BDB5-47A63D89879F}" type="datetime1">
-              <a:t>21/09/2023</a:t>
+              <a:t>23/09/2023</a:t>
             </a:fld>
             <a:endParaRPr lang="en-US"/>
           </a:p>
@@ -1585,7 +1585,7 @@
           <a:lstStyle/>
           <a:p>
             <a:fld id="{C71BC0A1-3625-D949-894B-12A4B1103545}" type="datetime1">
-              <a:t>21/09/2023</a:t>
+              <a:t>23/09/2023</a:t>
             </a:fld>
             <a:endParaRPr lang="en-US"/>
           </a:p>
@@ -1948,7 +1948,7 @@
           <a:lstStyle/>
           <a:p>
             <a:fld id="{631AF034-057E-7E42-A703-A16CE37858B1}" type="datetime1">
-              <a:t>21/09/2023</a:t>
+              <a:t>23/09/2023</a:t>
             </a:fld>
             <a:endParaRPr lang="en-US"/>
           </a:p>
@@ -2064,7 +2064,7 @@
           <a:lstStyle/>
           <a:p>
             <a:fld id="{6C312224-5262-0D45-8752-AD88DF7DF160}" type="datetime1">
-              <a:t>21/09/2023</a:t>
+              <a:t>23/09/2023</a:t>
             </a:fld>
             <a:endParaRPr lang="en-US"/>
           </a:p>
@@ -2158,7 +2158,7 @@
           <a:lstStyle/>
           <a:p>
             <a:fld id="{186C3894-04D4-E046-8AC0-98EC70D1D50C}" type="datetime1">
-              <a:t>21/09/2023</a:t>
+              <a:t>23/09/2023</a:t>
             </a:fld>
             <a:endParaRPr lang="en-US"/>
           </a:p>
@@ -2432,7 +2432,7 @@
           <a:lstStyle/>
           <a:p>
             <a:fld id="{BD6227EF-D3E1-B74B-97FE-FE43DF3D709B}" type="datetime1">
-              <a:t>21/09/2023</a:t>
+              <a:t>23/09/2023</a:t>
             </a:fld>
             <a:endParaRPr lang="en-US"/>
           </a:p>
@@ -2683,7 +2683,7 @@
           <a:lstStyle/>
           <a:p>
             <a:fld id="{1A1BECCB-56EF-1541-9CBC-CE4FC0155FEE}" type="datetime1">
-              <a:t>21/09/2023</a:t>
+              <a:t>23/09/2023</a:t>
             </a:fld>
             <a:endParaRPr lang="en-US"/>
           </a:p>
@@ -2893,7 +2893,7 @@
           </a:lstStyle>
           <a:p>
             <a:fld id="{0DFD353B-B5AB-CF4C-8D9F-51BDAFC66301}" type="datetime1">
-              <a:t>21/09/2023</a:t>
+              <a:t>23/09/2023</a:t>
             </a:fld>
             <a:endParaRPr lang="en-US"/>
           </a:p>
@@ -6104,7 +6104,22 @@
           <a:bodyPr/>
           <a:lstStyle/>
           <a:p>
-            <a:endParaRPr lang="en-VN"/>
+            <a:pPr marL="0" indent="0">
+              <a:buNone/>
+            </a:pPr>
+            <a:r>
+              <a:rPr lang="en-VN"/>
+              <a:t>MAUI -.net</a:t>
+            </a:r>
+          </a:p>
+          <a:p>
+            <a:pPr marL="0" indent="0">
+              <a:buNone/>
+            </a:pPr>
+            <a:r>
+              <a:rPr lang="en-VN"/>
+              <a:t>Alavonia UI</a:t>
+            </a:r>
           </a:p>
         </p:txBody>
       </p:sp>

</xml_diff>

<commit_message>
Update exercise in SE357
</commit_message>
<xml_diff>
--- a/IT008-Visual programming/Slide thực hành/Lab 1..pptx
+++ b/IT008-Visual programming/Slide thực hành/Lab 1..pptx
@@ -207,7 +207,7 @@
           </a:lstStyle>
           <a:p>
             <a:fld id="{D58EBEF0-1929-6C4C-9D10-0A24CA585262}" type="datetimeFigureOut">
-              <a:t>23/09/2023</a:t>
+              <a:t>27/09/2023</a:t>
             </a:fld>
             <a:endParaRPr lang="en-VN"/>
           </a:p>
@@ -602,7 +602,7 @@
           <a:lstStyle/>
           <a:p>
             <a:fld id="{0DDB0C27-5CC0-AE4B-A9B6-1C1A8F15976E}" type="datetime1">
-              <a:t>23/09/2023</a:t>
+              <a:t>27/09/2023</a:t>
             </a:fld>
             <a:endParaRPr lang="en-US"/>
           </a:p>
@@ -769,7 +769,7 @@
           <a:lstStyle/>
           <a:p>
             <a:fld id="{A1AB976C-5E89-BE46-B6A2-18E033DC7B7F}" type="datetime1">
-              <a:t>23/09/2023</a:t>
+              <a:t>27/09/2023</a:t>
             </a:fld>
             <a:endParaRPr lang="en-US"/>
           </a:p>
@@ -946,7 +946,7 @@
           <a:lstStyle/>
           <a:p>
             <a:fld id="{D3EB9961-F7AC-F442-9DA7-5C044E83E8F0}" type="datetime1">
-              <a:t>23/09/2023</a:t>
+              <a:t>27/09/2023</a:t>
             </a:fld>
             <a:endParaRPr lang="en-US"/>
           </a:p>
@@ -1113,7 +1113,7 @@
           <a:lstStyle/>
           <a:p>
             <a:fld id="{2BC5C2EC-D52B-4E49-9BD2-7F34EF2A2110}" type="datetime1">
-              <a:t>23/09/2023</a:t>
+              <a:t>27/09/2023</a:t>
             </a:fld>
             <a:endParaRPr lang="en-US"/>
           </a:p>
@@ -1357,7 +1357,7 @@
           <a:lstStyle/>
           <a:p>
             <a:fld id="{2E689BA2-5EDF-204F-BDB5-47A63D89879F}" type="datetime1">
-              <a:t>23/09/2023</a:t>
+              <a:t>27/09/2023</a:t>
             </a:fld>
             <a:endParaRPr lang="en-US"/>
           </a:p>
@@ -1585,7 +1585,7 @@
           <a:lstStyle/>
           <a:p>
             <a:fld id="{C71BC0A1-3625-D949-894B-12A4B1103545}" type="datetime1">
-              <a:t>23/09/2023</a:t>
+              <a:t>27/09/2023</a:t>
             </a:fld>
             <a:endParaRPr lang="en-US"/>
           </a:p>
@@ -1948,7 +1948,7 @@
           <a:lstStyle/>
           <a:p>
             <a:fld id="{631AF034-057E-7E42-A703-A16CE37858B1}" type="datetime1">
-              <a:t>23/09/2023</a:t>
+              <a:t>27/09/2023</a:t>
             </a:fld>
             <a:endParaRPr lang="en-US"/>
           </a:p>
@@ -2064,7 +2064,7 @@
           <a:lstStyle/>
           <a:p>
             <a:fld id="{6C312224-5262-0D45-8752-AD88DF7DF160}" type="datetime1">
-              <a:t>23/09/2023</a:t>
+              <a:t>27/09/2023</a:t>
             </a:fld>
             <a:endParaRPr lang="en-US"/>
           </a:p>
@@ -2158,7 +2158,7 @@
           <a:lstStyle/>
           <a:p>
             <a:fld id="{186C3894-04D4-E046-8AC0-98EC70D1D50C}" type="datetime1">
-              <a:t>23/09/2023</a:t>
+              <a:t>27/09/2023</a:t>
             </a:fld>
             <a:endParaRPr lang="en-US"/>
           </a:p>
@@ -2432,7 +2432,7 @@
           <a:lstStyle/>
           <a:p>
             <a:fld id="{BD6227EF-D3E1-B74B-97FE-FE43DF3D709B}" type="datetime1">
-              <a:t>23/09/2023</a:t>
+              <a:t>27/09/2023</a:t>
             </a:fld>
             <a:endParaRPr lang="en-US"/>
           </a:p>
@@ -2683,7 +2683,7 @@
           <a:lstStyle/>
           <a:p>
             <a:fld id="{1A1BECCB-56EF-1541-9CBC-CE4FC0155FEE}" type="datetime1">
-              <a:t>23/09/2023</a:t>
+              <a:t>27/09/2023</a:t>
             </a:fld>
             <a:endParaRPr lang="en-US"/>
           </a:p>
@@ -2893,7 +2893,7 @@
           </a:lstStyle>
           <a:p>
             <a:fld id="{0DFD353B-B5AB-CF4C-8D9F-51BDAFC66301}" type="datetime1">
-              <a:t>23/09/2023</a:t>
+              <a:t>27/09/2023</a:t>
             </a:fld>
             <a:endParaRPr lang="en-US"/>
           </a:p>
@@ -8734,19 +8734,13 @@
           <a:p>
             <a:r>
               <a:rPr lang="en-VN"/>
-              <a:t>Đăng ký nhóm: từ 1 – 2 sinh viên / nhóm</a:t>
+              <a:t>Đăng ký nhóm: theo nhóm lớp lý thuyết</a:t>
             </a:r>
           </a:p>
           <a:p>
             <a:r>
               <a:rPr lang="en-VN"/>
               <a:t>Update source code thường xuyên (trước 0:00 T4 mỗi 2 tuần) lên Github.</a:t>
-            </a:r>
-          </a:p>
-          <a:p>
-            <a:r>
-              <a:rPr lang="en-VN"/>
-              <a:t>Viết báo cáo theo định dạng quy định.</a:t>
             </a:r>
           </a:p>
         </p:txBody>

</xml_diff>